<commit_message>
Add SDA task files
</commit_message>
<xml_diff>
--- a/AI_tools.pptx
+++ b/AI_tools.pptx
@@ -5,15 +5,14 @@
     <p:sldMasterId id="2147483648" r:id="rId1"/>
   </p:sldMasterIdLst>
   <p:sldIdLst>
-    <p:sldId id="256" r:id="rId2"/>
-    <p:sldId id="257" r:id="rId3"/>
-    <p:sldId id="258" r:id="rId4"/>
-    <p:sldId id="259" r:id="rId5"/>
-    <p:sldId id="260" r:id="rId6"/>
-    <p:sldId id="261" r:id="rId7"/>
-    <p:sldId id="262" r:id="rId8"/>
-    <p:sldId id="263" r:id="rId9"/>
-    <p:sldId id="264" r:id="rId10"/>
+    <p:sldId id="257" r:id="rId2"/>
+    <p:sldId id="258" r:id="rId3"/>
+    <p:sldId id="259" r:id="rId4"/>
+    <p:sldId id="260" r:id="rId5"/>
+    <p:sldId id="261" r:id="rId6"/>
+    <p:sldId id="262" r:id="rId7"/>
+    <p:sldId id="263" r:id="rId8"/>
+    <p:sldId id="264" r:id="rId9"/>
   </p:sldIdLst>
   <p:sldSz cx="12192000" cy="6858000"/>
   <p:notesSz cx="6858000" cy="9144000"/>
@@ -112,6 +111,11 @@
       </a:defRPr>
     </a:lvl9pPr>
   </p:defaultTextStyle>
+  <p:extLst>
+    <p:ext uri="{EFAFB233-063F-42B5-8137-9DF3F51BA10A}">
+      <p15:sldGuideLst xmlns:p15="http://schemas.microsoft.com/office/powerpoint/2012/main"/>
+    </p:ext>
+  </p:extLst>
 </p:presentation>
 </file>
 
@@ -262,7 +266,7 @@
           <a:p>
             <a:fld id="{B589B477-325D-4292-A226-2E1BD5CC2476}" type="datetimeFigureOut">
               <a:rPr lang="pl-PL" smtClean="0"/>
-              <a:t>23.02.2023</a:t>
+              <a:t>03.03.2023</a:t>
             </a:fld>
             <a:endParaRPr lang="pl-PL"/>
           </a:p>
@@ -460,7 +464,7 @@
           <a:p>
             <a:fld id="{B589B477-325D-4292-A226-2E1BD5CC2476}" type="datetimeFigureOut">
               <a:rPr lang="pl-PL" smtClean="0"/>
-              <a:t>23.02.2023</a:t>
+              <a:t>03.03.2023</a:t>
             </a:fld>
             <a:endParaRPr lang="pl-PL"/>
           </a:p>
@@ -668,7 +672,7 @@
           <a:p>
             <a:fld id="{B589B477-325D-4292-A226-2E1BD5CC2476}" type="datetimeFigureOut">
               <a:rPr lang="pl-PL" smtClean="0"/>
-              <a:t>23.02.2023</a:t>
+              <a:t>03.03.2023</a:t>
             </a:fld>
             <a:endParaRPr lang="pl-PL"/>
           </a:p>
@@ -866,7 +870,7 @@
           <a:p>
             <a:fld id="{B589B477-325D-4292-A226-2E1BD5CC2476}" type="datetimeFigureOut">
               <a:rPr lang="pl-PL" smtClean="0"/>
-              <a:t>23.02.2023</a:t>
+              <a:t>03.03.2023</a:t>
             </a:fld>
             <a:endParaRPr lang="pl-PL"/>
           </a:p>
@@ -1141,7 +1145,7 @@
           <a:p>
             <a:fld id="{B589B477-325D-4292-A226-2E1BD5CC2476}" type="datetimeFigureOut">
               <a:rPr lang="pl-PL" smtClean="0"/>
-              <a:t>23.02.2023</a:t>
+              <a:t>03.03.2023</a:t>
             </a:fld>
             <a:endParaRPr lang="pl-PL"/>
           </a:p>
@@ -1406,7 +1410,7 @@
           <a:p>
             <a:fld id="{B589B477-325D-4292-A226-2E1BD5CC2476}" type="datetimeFigureOut">
               <a:rPr lang="pl-PL" smtClean="0"/>
-              <a:t>23.02.2023</a:t>
+              <a:t>03.03.2023</a:t>
             </a:fld>
             <a:endParaRPr lang="pl-PL"/>
           </a:p>
@@ -1818,7 +1822,7 @@
           <a:p>
             <a:fld id="{B589B477-325D-4292-A226-2E1BD5CC2476}" type="datetimeFigureOut">
               <a:rPr lang="pl-PL" smtClean="0"/>
-              <a:t>23.02.2023</a:t>
+              <a:t>03.03.2023</a:t>
             </a:fld>
             <a:endParaRPr lang="pl-PL"/>
           </a:p>
@@ -1959,7 +1963,7 @@
           <a:p>
             <a:fld id="{B589B477-325D-4292-A226-2E1BD5CC2476}" type="datetimeFigureOut">
               <a:rPr lang="pl-PL" smtClean="0"/>
-              <a:t>23.02.2023</a:t>
+              <a:t>03.03.2023</a:t>
             </a:fld>
             <a:endParaRPr lang="pl-PL"/>
           </a:p>
@@ -2072,7 +2076,7 @@
           <a:p>
             <a:fld id="{B589B477-325D-4292-A226-2E1BD5CC2476}" type="datetimeFigureOut">
               <a:rPr lang="pl-PL" smtClean="0"/>
-              <a:t>23.02.2023</a:t>
+              <a:t>03.03.2023</a:t>
             </a:fld>
             <a:endParaRPr lang="pl-PL"/>
           </a:p>
@@ -2383,7 +2387,7 @@
           <a:p>
             <a:fld id="{B589B477-325D-4292-A226-2E1BD5CC2476}" type="datetimeFigureOut">
               <a:rPr lang="pl-PL" smtClean="0"/>
-              <a:t>23.02.2023</a:t>
+              <a:t>03.03.2023</a:t>
             </a:fld>
             <a:endParaRPr lang="pl-PL"/>
           </a:p>
@@ -2671,7 +2675,7 @@
           <a:p>
             <a:fld id="{B589B477-325D-4292-A226-2E1BD5CC2476}" type="datetimeFigureOut">
               <a:rPr lang="pl-PL" smtClean="0"/>
-              <a:t>23.02.2023</a:t>
+              <a:t>03.03.2023</a:t>
             </a:fld>
             <a:endParaRPr lang="pl-PL"/>
           </a:p>
@@ -2912,7 +2916,7 @@
           <a:p>
             <a:fld id="{B589B477-325D-4292-A226-2E1BD5CC2476}" type="datetimeFigureOut">
               <a:rPr lang="pl-PL" smtClean="0"/>
-              <a:t>23.02.2023</a:t>
+              <a:t>03.03.2023</a:t>
             </a:fld>
             <a:endParaRPr lang="pl-PL"/>
           </a:p>
@@ -3315,6 +3319,16 @@
 <file path=ppt/slides/slide1.xml><?xml version="1.0" encoding="utf-8"?>
 <p:sld xmlns:a="http://schemas.openxmlformats.org/drawingml/2006/main" xmlns:r="http://schemas.openxmlformats.org/officeDocument/2006/relationships" xmlns:p="http://schemas.openxmlformats.org/presentationml/2006/main">
   <p:cSld>
+    <p:bg>
+      <p:bgPr>
+        <a:solidFill>
+          <a:schemeClr val="bg2">
+            <a:lumMod val="25000"/>
+          </a:schemeClr>
+        </a:solidFill>
+        <a:effectLst/>
+      </p:bgPr>
+    </p:bg>
     <p:spTree>
       <p:nvGrpSpPr>
         <p:cNvPr id="1" name=""/>
@@ -3329,60 +3343,40 @@
           <a:chExt cx="0" cy="0"/>
         </a:xfrm>
       </p:grpSpPr>
-      <p:sp>
-        <p:nvSpPr>
-          <p:cNvPr id="2" name="Tytuł 1">
-            <a:extLst>
-              <a:ext uri="{FF2B5EF4-FFF2-40B4-BE49-F238E27FC236}">
-                <a16:creationId xmlns:a16="http://schemas.microsoft.com/office/drawing/2014/main" id="{0537AF01-AA8B-173C-88D8-E4FEEDB339CD}"/>
-              </a:ext>
-            </a:extLst>
-          </p:cNvPr>
-          <p:cNvSpPr>
-            <a:spLocks noGrp="1"/>
-          </p:cNvSpPr>
-          <p:nvPr>
-            <p:ph type="ctrTitle"/>
-          </p:nvPr>
-        </p:nvSpPr>
-        <p:spPr/>
-        <p:txBody>
-          <a:bodyPr/>
-          <a:lstStyle/>
-          <a:p>
-            <a:endParaRPr lang="pl-PL"/>
-          </a:p>
-        </p:txBody>
-      </p:sp>
-      <p:sp>
-        <p:nvSpPr>
-          <p:cNvPr id="3" name="Podtytuł 2">
-            <a:extLst>
-              <a:ext uri="{FF2B5EF4-FFF2-40B4-BE49-F238E27FC236}">
-                <a16:creationId xmlns:a16="http://schemas.microsoft.com/office/drawing/2014/main" id="{CCFB87D9-8463-2033-ECC1-BE2FA7EBFDD4}"/>
-              </a:ext>
-            </a:extLst>
-          </p:cNvPr>
-          <p:cNvSpPr>
-            <a:spLocks noGrp="1"/>
-          </p:cNvSpPr>
-          <p:nvPr>
-            <p:ph type="subTitle" idx="1"/>
-          </p:nvPr>
-        </p:nvSpPr>
-        <p:spPr/>
-        <p:txBody>
-          <a:bodyPr/>
-          <a:lstStyle/>
-          <a:p>
-            <a:endParaRPr lang="pl-PL"/>
-          </a:p>
-        </p:txBody>
-      </p:sp>
+      <p:pic>
+        <p:nvPicPr>
+          <p:cNvPr id="5" name="Obraz 4">
+            <a:extLst>
+              <a:ext uri="{FF2B5EF4-FFF2-40B4-BE49-F238E27FC236}">
+                <a16:creationId xmlns:a16="http://schemas.microsoft.com/office/drawing/2014/main" id="{735F0ECA-7ACA-0D9F-3046-8DEB7239B4F1}"/>
+              </a:ext>
+            </a:extLst>
+          </p:cNvPr>
+          <p:cNvPicPr>
+            <a:picLocks noChangeAspect="1"/>
+          </p:cNvPicPr>
+          <p:nvPr/>
+        </p:nvPicPr>
+        <p:blipFill>
+          <a:blip r:embed="rId2"/>
+          <a:stretch>
+            <a:fillRect/>
+          </a:stretch>
+        </p:blipFill>
+        <p:spPr>
+          <a:xfrm>
+            <a:off x="2669572" y="0"/>
+            <a:ext cx="6852855" cy="6864671"/>
+          </a:xfrm>
+          <a:prstGeom prst="rect">
+            <a:avLst/>
+          </a:prstGeom>
+        </p:spPr>
+      </p:pic>
     </p:spTree>
     <p:extLst>
       <p:ext uri="{BB962C8B-B14F-4D97-AF65-F5344CB8AC3E}">
-        <p14:creationId xmlns:p14="http://schemas.microsoft.com/office/powerpoint/2010/main" val="1885765861"/>
+        <p14:creationId xmlns:p14="http://schemas.microsoft.com/office/powerpoint/2010/main" val="1767756310"/>
       </p:ext>
     </p:extLst>
   </p:cSld>
@@ -3421,10 +3415,10 @@
       </p:grpSpPr>
       <p:pic>
         <p:nvPicPr>
-          <p:cNvPr id="5" name="Obraz 4">
-            <a:extLst>
-              <a:ext uri="{FF2B5EF4-FFF2-40B4-BE49-F238E27FC236}">
-                <a16:creationId xmlns:a16="http://schemas.microsoft.com/office/drawing/2014/main" id="{735F0ECA-7ACA-0D9F-3046-8DEB7239B4F1}"/>
+          <p:cNvPr id="3" name="Obraz 2">
+            <a:extLst>
+              <a:ext uri="{FF2B5EF4-FFF2-40B4-BE49-F238E27FC236}">
+                <a16:creationId xmlns:a16="http://schemas.microsoft.com/office/drawing/2014/main" id="{45CD3A7B-547A-4D98-7504-F7232FEA9767}"/>
               </a:ext>
             </a:extLst>
           </p:cNvPr>
@@ -3441,8 +3435,8 @@
         </p:blipFill>
         <p:spPr>
           <a:xfrm>
-            <a:off x="2669572" y="0"/>
-            <a:ext cx="6852855" cy="6864671"/>
+            <a:off x="2858765" y="0"/>
+            <a:ext cx="6869865" cy="6858000"/>
           </a:xfrm>
           <a:prstGeom prst="rect">
             <a:avLst/>
@@ -3452,7 +3446,7 @@
     </p:spTree>
     <p:extLst>
       <p:ext uri="{BB962C8B-B14F-4D97-AF65-F5344CB8AC3E}">
-        <p14:creationId xmlns:p14="http://schemas.microsoft.com/office/powerpoint/2010/main" val="1767756310"/>
+        <p14:creationId xmlns:p14="http://schemas.microsoft.com/office/powerpoint/2010/main" val="979060256"/>
       </p:ext>
     </p:extLst>
   </p:cSld>
@@ -3494,7 +3488,7 @@
           <p:cNvPr id="3" name="Obraz 2">
             <a:extLst>
               <a:ext uri="{FF2B5EF4-FFF2-40B4-BE49-F238E27FC236}">
-                <a16:creationId xmlns:a16="http://schemas.microsoft.com/office/drawing/2014/main" id="{45CD3A7B-547A-4D98-7504-F7232FEA9767}"/>
+                <a16:creationId xmlns:a16="http://schemas.microsoft.com/office/drawing/2014/main" id="{C5F9FED0-2EE1-0655-83F1-454A4A31F673}"/>
               </a:ext>
             </a:extLst>
           </p:cNvPr>
@@ -3511,8 +3505,8 @@
         </p:blipFill>
         <p:spPr>
           <a:xfrm>
-            <a:off x="2858765" y="0"/>
-            <a:ext cx="6869865" cy="6858000"/>
+            <a:off x="2661057" y="0"/>
+            <a:ext cx="6869885" cy="6858000"/>
           </a:xfrm>
           <a:prstGeom prst="rect">
             <a:avLst/>
@@ -3522,7 +3516,7 @@
     </p:spTree>
     <p:extLst>
       <p:ext uri="{BB962C8B-B14F-4D97-AF65-F5344CB8AC3E}">
-        <p14:creationId xmlns:p14="http://schemas.microsoft.com/office/powerpoint/2010/main" val="979060256"/>
+        <p14:creationId xmlns:p14="http://schemas.microsoft.com/office/powerpoint/2010/main" val="2509624177"/>
       </p:ext>
     </p:extLst>
   </p:cSld>
@@ -3564,7 +3558,7 @@
           <p:cNvPr id="3" name="Obraz 2">
             <a:extLst>
               <a:ext uri="{FF2B5EF4-FFF2-40B4-BE49-F238E27FC236}">
-                <a16:creationId xmlns:a16="http://schemas.microsoft.com/office/drawing/2014/main" id="{C5F9FED0-2EE1-0655-83F1-454A4A31F673}"/>
+                <a16:creationId xmlns:a16="http://schemas.microsoft.com/office/drawing/2014/main" id="{346CF276-8815-42EF-AC36-C4BDE3D66045}"/>
               </a:ext>
             </a:extLst>
           </p:cNvPr>
@@ -3592,7 +3586,7 @@
     </p:spTree>
     <p:extLst>
       <p:ext uri="{BB962C8B-B14F-4D97-AF65-F5344CB8AC3E}">
-        <p14:creationId xmlns:p14="http://schemas.microsoft.com/office/powerpoint/2010/main" val="2509624177"/>
+        <p14:creationId xmlns:p14="http://schemas.microsoft.com/office/powerpoint/2010/main" val="2225330659"/>
       </p:ext>
     </p:extLst>
   </p:cSld>
@@ -3634,7 +3628,7 @@
           <p:cNvPr id="3" name="Obraz 2">
             <a:extLst>
               <a:ext uri="{FF2B5EF4-FFF2-40B4-BE49-F238E27FC236}">
-                <a16:creationId xmlns:a16="http://schemas.microsoft.com/office/drawing/2014/main" id="{346CF276-8815-42EF-AC36-C4BDE3D66045}"/>
+                <a16:creationId xmlns:a16="http://schemas.microsoft.com/office/drawing/2014/main" id="{2786826A-A74B-62D0-4F95-78C2637FDF0E}"/>
               </a:ext>
             </a:extLst>
           </p:cNvPr>
@@ -3651,8 +3645,8 @@
         </p:blipFill>
         <p:spPr>
           <a:xfrm>
-            <a:off x="2661057" y="0"/>
-            <a:ext cx="6869885" cy="6858000"/>
+            <a:off x="2652442" y="0"/>
+            <a:ext cx="6887115" cy="6863408"/>
           </a:xfrm>
           <a:prstGeom prst="rect">
             <a:avLst/>
@@ -3662,7 +3656,7 @@
     </p:spTree>
     <p:extLst>
       <p:ext uri="{BB962C8B-B14F-4D97-AF65-F5344CB8AC3E}">
-        <p14:creationId xmlns:p14="http://schemas.microsoft.com/office/powerpoint/2010/main" val="2225330659"/>
+        <p14:creationId xmlns:p14="http://schemas.microsoft.com/office/powerpoint/2010/main" val="2981557402"/>
       </p:ext>
     </p:extLst>
   </p:cSld>
@@ -3704,7 +3698,7 @@
           <p:cNvPr id="3" name="Obraz 2">
             <a:extLst>
               <a:ext uri="{FF2B5EF4-FFF2-40B4-BE49-F238E27FC236}">
-                <a16:creationId xmlns:a16="http://schemas.microsoft.com/office/drawing/2014/main" id="{2786826A-A74B-62D0-4F95-78C2637FDF0E}"/>
+                <a16:creationId xmlns:a16="http://schemas.microsoft.com/office/drawing/2014/main" id="{712E5189-D0ED-1D5F-CEE2-535D053C05F2}"/>
               </a:ext>
             </a:extLst>
           </p:cNvPr>
@@ -3721,8 +3715,8 @@
         </p:blipFill>
         <p:spPr>
           <a:xfrm>
-            <a:off x="2652442" y="0"/>
-            <a:ext cx="6887115" cy="6863408"/>
+            <a:off x="2667000" y="0"/>
+            <a:ext cx="6858000" cy="6858000"/>
           </a:xfrm>
           <a:prstGeom prst="rect">
             <a:avLst/>
@@ -3732,7 +3726,7 @@
     </p:spTree>
     <p:extLst>
       <p:ext uri="{BB962C8B-B14F-4D97-AF65-F5344CB8AC3E}">
-        <p14:creationId xmlns:p14="http://schemas.microsoft.com/office/powerpoint/2010/main" val="2981557402"/>
+        <p14:creationId xmlns:p14="http://schemas.microsoft.com/office/powerpoint/2010/main" val="2045256634"/>
       </p:ext>
     </p:extLst>
   </p:cSld>
@@ -3774,76 +3768,6 @@
           <p:cNvPr id="3" name="Obraz 2">
             <a:extLst>
               <a:ext uri="{FF2B5EF4-FFF2-40B4-BE49-F238E27FC236}">
-                <a16:creationId xmlns:a16="http://schemas.microsoft.com/office/drawing/2014/main" id="{712E5189-D0ED-1D5F-CEE2-535D053C05F2}"/>
-              </a:ext>
-            </a:extLst>
-          </p:cNvPr>
-          <p:cNvPicPr>
-            <a:picLocks noChangeAspect="1"/>
-          </p:cNvPicPr>
-          <p:nvPr/>
-        </p:nvPicPr>
-        <p:blipFill>
-          <a:blip r:embed="rId2"/>
-          <a:stretch>
-            <a:fillRect/>
-          </a:stretch>
-        </p:blipFill>
-        <p:spPr>
-          <a:xfrm>
-            <a:off x="2667000" y="0"/>
-            <a:ext cx="6858000" cy="6858000"/>
-          </a:xfrm>
-          <a:prstGeom prst="rect">
-            <a:avLst/>
-          </a:prstGeom>
-        </p:spPr>
-      </p:pic>
-    </p:spTree>
-    <p:extLst>
-      <p:ext uri="{BB962C8B-B14F-4D97-AF65-F5344CB8AC3E}">
-        <p14:creationId xmlns:p14="http://schemas.microsoft.com/office/powerpoint/2010/main" val="2045256634"/>
-      </p:ext>
-    </p:extLst>
-  </p:cSld>
-  <p:clrMapOvr>
-    <a:masterClrMapping/>
-  </p:clrMapOvr>
-</p:sld>
-</file>
-
-<file path=ppt/slides/slide8.xml><?xml version="1.0" encoding="utf-8"?>
-<p:sld xmlns:a="http://schemas.openxmlformats.org/drawingml/2006/main" xmlns:r="http://schemas.openxmlformats.org/officeDocument/2006/relationships" xmlns:p="http://schemas.openxmlformats.org/presentationml/2006/main">
-  <p:cSld>
-    <p:bg>
-      <p:bgPr>
-        <a:solidFill>
-          <a:schemeClr val="bg2">
-            <a:lumMod val="25000"/>
-          </a:schemeClr>
-        </a:solidFill>
-        <a:effectLst/>
-      </p:bgPr>
-    </p:bg>
-    <p:spTree>
-      <p:nvGrpSpPr>
-        <p:cNvPr id="1" name=""/>
-        <p:cNvGrpSpPr/>
-        <p:nvPr/>
-      </p:nvGrpSpPr>
-      <p:grpSpPr>
-        <a:xfrm>
-          <a:off x="0" y="0"/>
-          <a:ext cx="0" cy="0"/>
-          <a:chOff x="0" y="0"/>
-          <a:chExt cx="0" cy="0"/>
-        </a:xfrm>
-      </p:grpSpPr>
-      <p:pic>
-        <p:nvPicPr>
-          <p:cNvPr id="3" name="Obraz 2">
-            <a:extLst>
-              <a:ext uri="{FF2B5EF4-FFF2-40B4-BE49-F238E27FC236}">
                 <a16:creationId xmlns:a16="http://schemas.microsoft.com/office/drawing/2014/main" id="{90C4D62A-9055-345F-50B2-BF57ADFDF285}"/>
               </a:ext>
             </a:extLst>
@@ -3882,7 +3806,7 @@
 </p:sld>
 </file>
 
-<file path=ppt/slides/slide9.xml><?xml version="1.0" encoding="utf-8"?>
+<file path=ppt/slides/slide8.xml><?xml version="1.0" encoding="utf-8"?>
 <p:sld xmlns:a="http://schemas.openxmlformats.org/drawingml/2006/main" xmlns:r="http://schemas.openxmlformats.org/officeDocument/2006/relationships" xmlns:p="http://schemas.openxmlformats.org/presentationml/2006/main">
   <p:cSld>
     <p:bg>

</xml_diff>